<commit_message>
finished with the code for now
</commit_message>
<xml_diff>
--- a/home_insurance.pptx
+++ b/home_insurance.pptx
@@ -15,11 +15,11 @@
     <p:sldId id="262" r:id="rId9"/>
     <p:sldId id="278" r:id="rId10"/>
     <p:sldId id="274" r:id="rId11"/>
-    <p:sldId id="279" r:id="rId12"/>
-    <p:sldId id="280" r:id="rId13"/>
-    <p:sldId id="284" r:id="rId14"/>
-    <p:sldId id="283" r:id="rId15"/>
-    <p:sldId id="282" r:id="rId16"/>
+    <p:sldId id="285" r:id="rId12"/>
+    <p:sldId id="279" r:id="rId13"/>
+    <p:sldId id="280" r:id="rId14"/>
+    <p:sldId id="284" r:id="rId15"/>
+    <p:sldId id="283" r:id="rId16"/>
     <p:sldId id="270" r:id="rId17"/>
     <p:sldId id="267" r:id="rId18"/>
   </p:sldIdLst>
@@ -851,7 +851,7 @@
             <a:fld id="{B61BEF0D-F0BB-DE4B-95CE-6DB70DBA9567}" type="datetimeFigureOut">
               <a:rPr lang="en-US" dirty="0"/>
               <a:pPr/>
-              <a:t>9/4/2022</a:t>
+              <a:t>9/5/2022</a:t>
             </a:fld>
             <a:endParaRPr lang="en-US" dirty="0"/>
           </a:p>
@@ -1099,7 +1099,7 @@
             <a:fld id="{B61BEF0D-F0BB-DE4B-95CE-6DB70DBA9567}" type="datetimeFigureOut">
               <a:rPr lang="en-US" dirty="0"/>
               <a:pPr/>
-              <a:t>9/4/2022</a:t>
+              <a:t>9/5/2022</a:t>
             </a:fld>
             <a:endParaRPr lang="en-US" dirty="0"/>
           </a:p>
@@ -1410,7 +1410,7 @@
             <a:fld id="{B61BEF0D-F0BB-DE4B-95CE-6DB70DBA9567}" type="datetimeFigureOut">
               <a:rPr lang="en-US" dirty="0"/>
               <a:pPr/>
-              <a:t>9/4/2022</a:t>
+              <a:t>9/5/2022</a:t>
             </a:fld>
             <a:endParaRPr lang="en-US" dirty="0"/>
           </a:p>
@@ -1748,7 +1748,7 @@
             <a:fld id="{B61BEF0D-F0BB-DE4B-95CE-6DB70DBA9567}" type="datetimeFigureOut">
               <a:rPr lang="en-US" dirty="0"/>
               <a:pPr/>
-              <a:t>9/4/2022</a:t>
+              <a:t>9/5/2022</a:t>
             </a:fld>
             <a:endParaRPr lang="en-US" dirty="0"/>
           </a:p>
@@ -2059,7 +2059,7 @@
             <a:fld id="{B61BEF0D-F0BB-DE4B-95CE-6DB70DBA9567}" type="datetimeFigureOut">
               <a:rPr lang="en-US" dirty="0"/>
               <a:pPr/>
-              <a:t>9/4/2022</a:t>
+              <a:t>9/5/2022</a:t>
             </a:fld>
             <a:endParaRPr lang="en-US" dirty="0"/>
           </a:p>
@@ -2449,7 +2449,7 @@
             <a:fld id="{B61BEF0D-F0BB-DE4B-95CE-6DB70DBA9567}" type="datetimeFigureOut">
               <a:rPr lang="en-US" dirty="0"/>
               <a:pPr/>
-              <a:t>9/4/2022</a:t>
+              <a:t>9/5/2022</a:t>
             </a:fld>
             <a:endParaRPr lang="en-US" dirty="0"/>
           </a:p>
@@ -2615,7 +2615,7 @@
           <a:p>
             <a:fld id="{55C6B4A9-1611-4792-9094-5F34BCA07E0B}" type="datetimeFigureOut">
               <a:rPr lang="en-US" dirty="0"/>
-              <a:t>9/4/2022</a:t>
+              <a:t>9/5/2022</a:t>
             </a:fld>
             <a:endParaRPr lang="en-US" dirty="0"/>
           </a:p>
@@ -2791,7 +2791,7 @@
             <a:fld id="{B61BEF0D-F0BB-DE4B-95CE-6DB70DBA9567}" type="datetimeFigureOut">
               <a:rPr lang="en-US" dirty="0"/>
               <a:pPr/>
-              <a:t>9/4/2022</a:t>
+              <a:t>9/5/2022</a:t>
             </a:fld>
             <a:endParaRPr lang="en-US" dirty="0"/>
           </a:p>
@@ -2964,7 +2964,7 @@
             <a:fld id="{B61BEF0D-F0BB-DE4B-95CE-6DB70DBA9567}" type="datetimeFigureOut">
               <a:rPr lang="en-US" dirty="0"/>
               <a:pPr/>
-              <a:t>9/4/2022</a:t>
+              <a:t>9/5/2022</a:t>
             </a:fld>
             <a:endParaRPr lang="en-US" dirty="0"/>
           </a:p>
@@ -3208,7 +3208,7 @@
             <a:fld id="{B61BEF0D-F0BB-DE4B-95CE-6DB70DBA9567}" type="datetimeFigureOut">
               <a:rPr lang="en-US" dirty="0"/>
               <a:pPr/>
-              <a:t>9/4/2022</a:t>
+              <a:t>9/5/2022</a:t>
             </a:fld>
             <a:endParaRPr lang="en-US" dirty="0"/>
           </a:p>
@@ -3436,7 +3436,7 @@
           <a:p>
             <a:fld id="{EB712588-04B1-427B-82EE-E8DB90309F08}" type="datetimeFigureOut">
               <a:rPr lang="en-US" dirty="0"/>
-              <a:t>9/4/2022</a:t>
+              <a:t>9/5/2022</a:t>
             </a:fld>
             <a:endParaRPr lang="en-US" dirty="0"/>
           </a:p>
@@ -3806,7 +3806,7 @@
             <a:fld id="{B61BEF0D-F0BB-DE4B-95CE-6DB70DBA9567}" type="datetimeFigureOut">
               <a:rPr lang="en-US" dirty="0"/>
               <a:pPr/>
-              <a:t>9/4/2022</a:t>
+              <a:t>9/5/2022</a:t>
             </a:fld>
             <a:endParaRPr lang="en-US" dirty="0"/>
           </a:p>
@@ -3926,7 +3926,7 @@
             <a:fld id="{B61BEF0D-F0BB-DE4B-95CE-6DB70DBA9567}" type="datetimeFigureOut">
               <a:rPr lang="en-US" dirty="0"/>
               <a:pPr/>
-              <a:t>9/4/2022</a:t>
+              <a:t>9/5/2022</a:t>
             </a:fld>
             <a:endParaRPr lang="en-US" dirty="0"/>
           </a:p>
@@ -4018,7 +4018,7 @@
             <a:fld id="{B61BEF0D-F0BB-DE4B-95CE-6DB70DBA9567}" type="datetimeFigureOut">
               <a:rPr lang="en-US" dirty="0"/>
               <a:pPr/>
-              <a:t>9/4/2022</a:t>
+              <a:t>9/5/2022</a:t>
             </a:fld>
             <a:endParaRPr lang="en-US" dirty="0"/>
           </a:p>
@@ -4269,7 +4269,7 @@
           <a:p>
             <a:fld id="{42A54C80-263E-416B-A8E0-580EDEADCBDC}" type="datetimeFigureOut">
               <a:rPr lang="en-US" dirty="0"/>
-              <a:t>9/4/2022</a:t>
+              <a:t>9/5/2022</a:t>
             </a:fld>
             <a:endParaRPr lang="en-US" dirty="0"/>
           </a:p>
@@ -4528,7 +4528,7 @@
             <a:fld id="{B61BEF0D-F0BB-DE4B-95CE-6DB70DBA9567}" type="datetimeFigureOut">
               <a:rPr lang="en-US" dirty="0"/>
               <a:pPr/>
-              <a:t>9/4/2022</a:t>
+              <a:t>9/5/2022</a:t>
             </a:fld>
             <a:endParaRPr lang="en-US" dirty="0"/>
           </a:p>
@@ -5268,7 +5268,7 @@
             <a:fld id="{B61BEF0D-F0BB-DE4B-95CE-6DB70DBA9567}" type="datetimeFigureOut">
               <a:rPr lang="en-US" dirty="0"/>
               <a:pPr/>
-              <a:t>9/4/2022</a:t>
+              <a:t>9/5/2022</a:t>
             </a:fld>
             <a:endParaRPr lang="en-US" dirty="0"/>
           </a:p>
@@ -6326,7 +6326,7 @@
           <a:p>
             <a:r>
               <a:rPr lang="en-GB" dirty="0"/>
-              <a:t>Modelling - Process</a:t>
+              <a:t>Modelling – XGB choice</a:t>
             </a:r>
           </a:p>
         </p:txBody>
@@ -6354,7 +6354,152 @@
           </a:xfrm>
         </p:spPr>
         <p:txBody>
+          <a:bodyPr>
+            <a:normAutofit/>
+          </a:bodyPr>
+          <a:lstStyle/>
+          <a:p>
+            <a:r>
+              <a:rPr lang="en-GB" dirty="0"/>
+              <a:t>Since it was a binary classification problem, it lent itself to one of the standard classification algorithms</a:t>
+            </a:r>
+          </a:p>
+          <a:p>
+            <a:endParaRPr lang="en-GB" dirty="0"/>
+          </a:p>
+          <a:p>
+            <a:r>
+              <a:rPr lang="en-GB" dirty="0"/>
+              <a:t>The dataset itself is fairly large and logistic regression performed poorly, F1 scores of 0.60 and 0.63 when passed through PCA</a:t>
+            </a:r>
+          </a:p>
+          <a:p>
+            <a:endParaRPr lang="en-GB" dirty="0"/>
+          </a:p>
+          <a:p>
+            <a:r>
+              <a:rPr lang="en-GB" dirty="0"/>
+              <a:t>This led to a tree implementation being preferred due to their robustness to outliers and no need for the data to be standardised</a:t>
+            </a:r>
+          </a:p>
+          <a:p>
+            <a:endParaRPr lang="en-GB" dirty="0"/>
+          </a:p>
+          <a:p>
+            <a:r>
+              <a:rPr lang="en-GB" dirty="0"/>
+              <a:t>XGB was chosen over random forest due to it’s harsher regularisation capabilities which would allow it to remove unnecessary features</a:t>
+            </a:r>
+          </a:p>
+          <a:p>
+            <a:endParaRPr lang="en-GB" sz="1400" dirty="0"/>
+          </a:p>
+          <a:p>
+            <a:endParaRPr lang="en-GB" dirty="0"/>
+          </a:p>
+          <a:p>
+            <a:endParaRPr lang="en-GB" dirty="0"/>
+          </a:p>
+          <a:p>
+            <a:endParaRPr lang="en-GB" dirty="0"/>
+          </a:p>
+          <a:p>
+            <a:endParaRPr lang="en-GB" dirty="0"/>
+          </a:p>
+          <a:p>
+            <a:endParaRPr lang="en-GB" dirty="0"/>
+          </a:p>
+        </p:txBody>
+      </p:sp>
+    </p:spTree>
+    <p:extLst>
+      <p:ext uri="{BB962C8B-B14F-4D97-AF65-F5344CB8AC3E}">
+        <p14:creationId xmlns:p14="http://schemas.microsoft.com/office/powerpoint/2010/main" val="3409093306"/>
+      </p:ext>
+    </p:extLst>
+  </p:cSld>
+  <p:clrMapOvr>
+    <a:masterClrMapping/>
+  </p:clrMapOvr>
+</p:sld>
+</file>
+
+<file path=ppt/slides/slide12.xml><?xml version="1.0" encoding="utf-8"?>
+<p:sld xmlns:a="http://schemas.openxmlformats.org/drawingml/2006/main" xmlns:r="http://schemas.openxmlformats.org/officeDocument/2006/relationships" xmlns:p="http://schemas.openxmlformats.org/presentationml/2006/main">
+  <p:cSld>
+    <p:spTree>
+      <p:nvGrpSpPr>
+        <p:cNvPr id="1" name=""/>
+        <p:cNvGrpSpPr/>
+        <p:nvPr/>
+      </p:nvGrpSpPr>
+      <p:grpSpPr>
+        <a:xfrm>
+          <a:off x="0" y="0"/>
+          <a:ext cx="0" cy="0"/>
+          <a:chOff x="0" y="0"/>
+          <a:chExt cx="0" cy="0"/>
+        </a:xfrm>
+      </p:grpSpPr>
+      <p:sp>
+        <p:nvSpPr>
+          <p:cNvPr id="2" name="Title 1">
+            <a:extLst>
+              <a:ext uri="{FF2B5EF4-FFF2-40B4-BE49-F238E27FC236}">
+                <a16:creationId xmlns:a16="http://schemas.microsoft.com/office/drawing/2014/main" id="{3BB8B0B7-7C2B-5D88-0472-09808181CC88}"/>
+              </a:ext>
+            </a:extLst>
+          </p:cNvPr>
+          <p:cNvSpPr>
+            <a:spLocks noGrp="1"/>
+          </p:cNvSpPr>
+          <p:nvPr>
+            <p:ph type="title"/>
+          </p:nvPr>
+        </p:nvSpPr>
+        <p:spPr>
+          <a:xfrm>
+            <a:off x="677334" y="609600"/>
+            <a:ext cx="8596668" cy="1313543"/>
+          </a:xfrm>
+        </p:spPr>
+        <p:txBody>
           <a:bodyPr/>
+          <a:lstStyle/>
+          <a:p>
+            <a:r>
+              <a:rPr lang="en-GB" dirty="0"/>
+              <a:t>Modelling – Process</a:t>
+            </a:r>
+          </a:p>
+        </p:txBody>
+      </p:sp>
+      <p:sp>
+        <p:nvSpPr>
+          <p:cNvPr id="3" name="Content Placeholder 2">
+            <a:extLst>
+              <a:ext uri="{FF2B5EF4-FFF2-40B4-BE49-F238E27FC236}">
+                <a16:creationId xmlns:a16="http://schemas.microsoft.com/office/drawing/2014/main" id="{948B98EB-D9C5-7C10-A0D6-F889E6293F96}"/>
+              </a:ext>
+            </a:extLst>
+          </p:cNvPr>
+          <p:cNvSpPr>
+            <a:spLocks noGrp="1"/>
+          </p:cNvSpPr>
+          <p:nvPr>
+            <p:ph idx="1"/>
+          </p:nvPr>
+        </p:nvSpPr>
+        <p:spPr>
+          <a:xfrm>
+            <a:off x="677334" y="1488613"/>
+            <a:ext cx="8596668" cy="3880773"/>
+          </a:xfrm>
+        </p:spPr>
+        <p:txBody>
+          <a:bodyPr>
+            <a:noAutofit/>
+          </a:bodyPr>
           <a:lstStyle/>
           <a:p>
             <a:r>
@@ -6368,56 +6513,22 @@
           <a:p>
             <a:r>
               <a:rPr lang="en-GB" dirty="0"/>
-              <a:t>This uses a </a:t>
-            </a:r>
-            <a:r>
-              <a:rPr lang="en-GB" b="0" dirty="0">
-                <a:solidFill>
-                  <a:srgbClr val="CE9178"/>
-                </a:solidFill>
-                <a:effectLst/>
-                <a:latin typeface="Consolas" panose="020B0609020204030204" pitchFamily="49" charset="0"/>
-              </a:rPr>
-              <a:t>"</a:t>
-            </a:r>
-            <a:r>
-              <a:rPr lang="en-GB" b="0" dirty="0" err="1">
-                <a:solidFill>
-                  <a:srgbClr val="CE9178"/>
-                </a:solidFill>
-                <a:effectLst/>
-                <a:latin typeface="Consolas" panose="020B0609020204030204" pitchFamily="49" charset="0"/>
-              </a:rPr>
+              <a:t>This uses a "</a:t>
+            </a:r>
+            <a:r>
+              <a:rPr lang="en-GB" dirty="0" err="1"/>
               <a:t>binary:logistic</a:t>
             </a:r>
             <a:r>
-              <a:rPr lang="en-GB" b="0" dirty="0">
-                <a:solidFill>
-                  <a:srgbClr val="CE9178"/>
-                </a:solidFill>
-                <a:effectLst/>
-                <a:latin typeface="Consolas" panose="020B0609020204030204" pitchFamily="49" charset="0"/>
-              </a:rPr>
-              <a:t>“ </a:t>
-            </a:r>
-            <a:r>
-              <a:rPr lang="en-GB" b="0" dirty="0">
-                <a:effectLst/>
-              </a:rPr>
-              <a:t>objective function</a:t>
+              <a:rPr lang="en-GB" dirty="0"/>
+              <a:t>“ objective function</a:t>
             </a:r>
           </a:p>
           <a:p>
             <a:pPr marL="0" indent="0">
               <a:buNone/>
             </a:pPr>
-            <a:endParaRPr lang="en-GB" b="0" dirty="0">
-              <a:solidFill>
-                <a:srgbClr val="D4D4D4"/>
-              </a:solidFill>
-              <a:effectLst/>
-              <a:latin typeface="Consolas" panose="020B0609020204030204" pitchFamily="49" charset="0"/>
-            </a:endParaRPr>
+            <a:endParaRPr lang="en-GB" dirty="0"/>
           </a:p>
           <a:p>
             <a:r>
@@ -6431,14 +6542,17 @@
           <a:p>
             <a:r>
               <a:rPr lang="en-GB" dirty="0"/>
-              <a:t>These were then used to build the final prediction model which was then tested against a test dataset and the F1 score and confusion matrix calculated and used for verifying the performance of the model</a:t>
+              <a:t>These were then used to build the final prediction model which was then run against a test dataset</a:t>
             </a:r>
           </a:p>
           <a:p>
             <a:endParaRPr lang="en-GB" dirty="0"/>
           </a:p>
           <a:p>
-            <a:endParaRPr lang="en-GB" dirty="0"/>
+            <a:r>
+              <a:rPr lang="en-GB" dirty="0"/>
+              <a:t>Model performance verification was undertaken using a confusion matrix</a:t>
+            </a:r>
           </a:p>
         </p:txBody>
       </p:sp>
@@ -6455,7 +6569,7 @@
 </p:sld>
 </file>
 
-<file path=ppt/slides/slide12.xml><?xml version="1.0" encoding="utf-8"?>
+<file path=ppt/slides/slide13.xml><?xml version="1.0" encoding="utf-8"?>
 <p:sld xmlns:a="http://schemas.openxmlformats.org/drawingml/2006/main" xmlns:r="http://schemas.openxmlformats.org/officeDocument/2006/relationships" xmlns:p="http://schemas.openxmlformats.org/presentationml/2006/main">
   <p:cSld>
     <p:bg>
@@ -6643,150 +6757,6 @@
 </p:sld>
 </file>
 
-<file path=ppt/slides/slide13.xml><?xml version="1.0" encoding="utf-8"?>
-<p:sld xmlns:a="http://schemas.openxmlformats.org/drawingml/2006/main" xmlns:r="http://schemas.openxmlformats.org/officeDocument/2006/relationships" xmlns:p="http://schemas.openxmlformats.org/presentationml/2006/main">
-  <p:cSld>
-    <p:spTree>
-      <p:nvGrpSpPr>
-        <p:cNvPr id="1" name=""/>
-        <p:cNvGrpSpPr/>
-        <p:nvPr/>
-      </p:nvGrpSpPr>
-      <p:grpSpPr>
-        <a:xfrm>
-          <a:off x="0" y="0"/>
-          <a:ext cx="0" cy="0"/>
-          <a:chOff x="0" y="0"/>
-          <a:chExt cx="0" cy="0"/>
-        </a:xfrm>
-      </p:grpSpPr>
-      <p:sp>
-        <p:nvSpPr>
-          <p:cNvPr id="2" name="Title 1">
-            <a:extLst>
-              <a:ext uri="{FF2B5EF4-FFF2-40B4-BE49-F238E27FC236}">
-                <a16:creationId xmlns:a16="http://schemas.microsoft.com/office/drawing/2014/main" id="{3BB8B0B7-7C2B-5D88-0472-09808181CC88}"/>
-              </a:ext>
-            </a:extLst>
-          </p:cNvPr>
-          <p:cNvSpPr>
-            <a:spLocks noGrp="1"/>
-          </p:cNvSpPr>
-          <p:nvPr>
-            <p:ph type="title"/>
-          </p:nvPr>
-        </p:nvSpPr>
-        <p:spPr/>
-        <p:txBody>
-          <a:bodyPr/>
-          <a:lstStyle/>
-          <a:p>
-            <a:r>
-              <a:rPr lang="en-GB" dirty="0"/>
-              <a:t>Modelling – What drives lapses</a:t>
-            </a:r>
-          </a:p>
-        </p:txBody>
-      </p:sp>
-      <p:sp>
-        <p:nvSpPr>
-          <p:cNvPr id="3" name="Content Placeholder 2">
-            <a:extLst>
-              <a:ext uri="{FF2B5EF4-FFF2-40B4-BE49-F238E27FC236}">
-                <a16:creationId xmlns:a16="http://schemas.microsoft.com/office/drawing/2014/main" id="{948B98EB-D9C5-7C10-A0D6-F889E6293F96}"/>
-              </a:ext>
-            </a:extLst>
-          </p:cNvPr>
-          <p:cNvSpPr>
-            <a:spLocks noGrp="1"/>
-          </p:cNvSpPr>
-          <p:nvPr>
-            <p:ph idx="1"/>
-          </p:nvPr>
-        </p:nvSpPr>
-        <p:spPr>
-          <a:xfrm>
-            <a:off x="677334" y="1488613"/>
-            <a:ext cx="8596668" cy="3880773"/>
-          </a:xfrm>
-        </p:spPr>
-        <p:txBody>
-          <a:bodyPr>
-            <a:normAutofit/>
-          </a:bodyPr>
-          <a:lstStyle/>
-          <a:p>
-            <a:r>
-              <a:rPr lang="en-GB" dirty="0"/>
-              <a:t>Removal/addition of benefits as defined by YN options</a:t>
-            </a:r>
-          </a:p>
-          <a:p>
-            <a:endParaRPr lang="en-GB" dirty="0"/>
-          </a:p>
-          <a:p>
-            <a:r>
-              <a:rPr lang="en-GB" dirty="0"/>
-              <a:t>Payment method not being pure direct debit</a:t>
-            </a:r>
-          </a:p>
-          <a:p>
-            <a:endParaRPr lang="en-GB" dirty="0"/>
-          </a:p>
-          <a:p>
-            <a:r>
-              <a:rPr lang="en-GB" dirty="0"/>
-              <a:t>As risk rating increases so does its driver for lapsing</a:t>
-            </a:r>
-          </a:p>
-          <a:p>
-            <a:pPr marL="0" indent="0">
-              <a:buNone/>
-            </a:pPr>
-            <a:endParaRPr lang="en-GB" dirty="0"/>
-          </a:p>
-          <a:p>
-            <a:r>
-              <a:rPr lang="en-GB" dirty="0"/>
-              <a:t>Additional Buildings cover being yes </a:t>
-            </a:r>
-          </a:p>
-          <a:p>
-            <a:pPr marL="0" indent="0">
-              <a:buNone/>
-            </a:pPr>
-            <a:endParaRPr lang="en-GB" b="0" dirty="0">
-              <a:solidFill>
-                <a:srgbClr val="D4D4D4"/>
-              </a:solidFill>
-              <a:effectLst/>
-              <a:latin typeface="Consolas" panose="020B0609020204030204" pitchFamily="49" charset="0"/>
-            </a:endParaRPr>
-          </a:p>
-          <a:p>
-            <a:pPr marL="0" indent="0">
-              <a:buNone/>
-            </a:pPr>
-            <a:endParaRPr lang="en-GB" dirty="0"/>
-          </a:p>
-          <a:p>
-            <a:endParaRPr lang="en-GB" dirty="0"/>
-          </a:p>
-        </p:txBody>
-      </p:sp>
-    </p:spTree>
-    <p:extLst>
-      <p:ext uri="{BB962C8B-B14F-4D97-AF65-F5344CB8AC3E}">
-        <p14:creationId xmlns:p14="http://schemas.microsoft.com/office/powerpoint/2010/main" val="2904675807"/>
-      </p:ext>
-    </p:extLst>
-  </p:cSld>
-  <p:clrMapOvr>
-    <a:masterClrMapping/>
-  </p:clrMapOvr>
-</p:sld>
-</file>
-
 <file path=ppt/slides/slide14.xml><?xml version="1.0" encoding="utf-8"?>
 <p:sld xmlns:a="http://schemas.openxmlformats.org/drawingml/2006/main" xmlns:r="http://schemas.openxmlformats.org/officeDocument/2006/relationships" xmlns:p="http://schemas.openxmlformats.org/presentationml/2006/main">
   <p:cSld>
@@ -6862,7 +6832,7 @@
           <a:p>
             <a:r>
               <a:rPr lang="en-GB" dirty="0"/>
-              <a:t>Could be removing options due to financial struggles and is then a precursor to lapsing</a:t>
+              <a:t>Removal/addition of benefits as defined by YN options</a:t>
             </a:r>
           </a:p>
           <a:p>
@@ -6871,7 +6841,7 @@
           <a:p>
             <a:r>
               <a:rPr lang="en-GB" dirty="0"/>
-              <a:t>Can we offer incentives to setup direct debit payments</a:t>
+              <a:t>Payment method not being pure direct debit</a:t>
             </a:r>
           </a:p>
           <a:p>
@@ -6880,23 +6850,20 @@
           <a:p>
             <a:r>
               <a:rPr lang="en-GB" dirty="0"/>
-              <a:t>Should we assess how competitive our pricing is for higher risk ratings</a:t>
-            </a:r>
-          </a:p>
-          <a:p>
-            <a:endParaRPr lang="en-GB"/>
-          </a:p>
-          <a:p>
-            <a:endParaRPr lang="en-GB" dirty="0"/>
-          </a:p>
-          <a:p>
-            <a:endParaRPr lang="en-GB" dirty="0"/>
+              <a:t>As risk rating increases so does its driver for lapsing</a:t>
+            </a:r>
           </a:p>
           <a:p>
             <a:pPr marL="0" indent="0">
               <a:buNone/>
             </a:pPr>
             <a:endParaRPr lang="en-GB" dirty="0"/>
+          </a:p>
+          <a:p>
+            <a:r>
+              <a:rPr lang="en-GB" dirty="0"/>
+              <a:t>Additional Buildings cover being yes </a:t>
+            </a:r>
           </a:p>
           <a:p>
             <a:pPr marL="0" indent="0">
@@ -6924,7 +6891,7 @@
     </p:spTree>
     <p:extLst>
       <p:ext uri="{BB962C8B-B14F-4D97-AF65-F5344CB8AC3E}">
-        <p14:creationId xmlns:p14="http://schemas.microsoft.com/office/powerpoint/2010/main" val="755547897"/>
+        <p14:creationId xmlns:p14="http://schemas.microsoft.com/office/powerpoint/2010/main" val="2904675807"/>
       </p:ext>
     </p:extLst>
   </p:cSld>
@@ -6937,14 +6904,6 @@
 <file path=ppt/slides/slide15.xml><?xml version="1.0" encoding="utf-8"?>
 <p:sld xmlns:a="http://schemas.openxmlformats.org/drawingml/2006/main" xmlns:r="http://schemas.openxmlformats.org/officeDocument/2006/relationships" xmlns:p="http://schemas.openxmlformats.org/presentationml/2006/main">
   <p:cSld>
-    <p:bg>
-      <p:bgPr>
-        <a:solidFill>
-          <a:schemeClr val="bg1"/>
-        </a:solidFill>
-        <a:effectLst/>
-      </p:bgPr>
-    </p:bg>
     <p:spTree>
       <p:nvGrpSpPr>
         <p:cNvPr id="1" name=""/>
@@ -6975,16 +6934,9 @@
             <p:ph type="title"/>
           </p:nvPr>
         </p:nvSpPr>
-        <p:spPr>
-          <a:xfrm>
-            <a:off x="677334" y="609600"/>
-            <a:ext cx="8596668" cy="1320800"/>
-          </a:xfrm>
-        </p:spPr>
-        <p:txBody>
-          <a:bodyPr anchor="t">
-            <a:normAutofit/>
-          </a:bodyPr>
+        <p:spPr/>
+        <p:txBody>
+          <a:bodyPr/>
           <a:lstStyle/>
           <a:p>
             <a:r>
@@ -7012,8 +6964,8 @@
         </p:nvSpPr>
         <p:spPr>
           <a:xfrm>
-            <a:off x="677334" y="2011680"/>
-            <a:ext cx="4110797" cy="4029682"/>
+            <a:off x="677334" y="1488613"/>
+            <a:ext cx="8596668" cy="3880773"/>
           </a:xfrm>
         </p:spPr>
         <p:txBody>
@@ -7022,6 +6974,42 @@
           </a:bodyPr>
           <a:lstStyle/>
           <a:p>
+            <a:r>
+              <a:rPr lang="en-GB" dirty="0"/>
+              <a:t>Could be removing options due to financial struggles and is then a precursor to lapsing</a:t>
+            </a:r>
+          </a:p>
+          <a:p>
+            <a:endParaRPr lang="en-GB" dirty="0"/>
+          </a:p>
+          <a:p>
+            <a:r>
+              <a:rPr lang="en-GB" dirty="0"/>
+              <a:t>Can we offer incentives to setup direct debit payments</a:t>
+            </a:r>
+          </a:p>
+          <a:p>
+            <a:endParaRPr lang="en-GB" dirty="0"/>
+          </a:p>
+          <a:p>
+            <a:r>
+              <a:rPr lang="en-GB" dirty="0"/>
+              <a:t>Should we assess how competitive our pricing is for higher risk ratings</a:t>
+            </a:r>
+          </a:p>
+          <a:p>
+            <a:endParaRPr lang="en-GB" dirty="0"/>
+          </a:p>
+          <a:p>
+            <a:r>
+              <a:rPr lang="en-GB" dirty="0"/>
+              <a:t>Should we offer more options for additional buildings cover other than 0 or 1 million</a:t>
+            </a:r>
+          </a:p>
+          <a:p>
+            <a:endParaRPr lang="en-GB" dirty="0"/>
+          </a:p>
+          <a:p>
             <a:endParaRPr lang="en-GB" dirty="0"/>
           </a:p>
           <a:p>
@@ -7032,6 +7020,18 @@
               <a:buNone/>
             </a:pPr>
             <a:endParaRPr lang="en-GB" dirty="0"/>
+          </a:p>
+          <a:p>
+            <a:pPr marL="0" indent="0">
+              <a:buNone/>
+            </a:pPr>
+            <a:endParaRPr lang="en-GB" b="0" dirty="0">
+              <a:solidFill>
+                <a:srgbClr val="D4D4D4"/>
+              </a:solidFill>
+              <a:effectLst/>
+              <a:latin typeface="Consolas" panose="020B0609020204030204" pitchFamily="49" charset="0"/>
+            </a:endParaRPr>
           </a:p>
           <a:p>
             <a:pPr marL="0" indent="0">
@@ -7047,7 +7047,7 @@
     </p:spTree>
     <p:extLst>
       <p:ext uri="{BB962C8B-B14F-4D97-AF65-F5344CB8AC3E}">
-        <p14:creationId xmlns:p14="http://schemas.microsoft.com/office/powerpoint/2010/main" val="2699093591"/>
+        <p14:creationId xmlns:p14="http://schemas.microsoft.com/office/powerpoint/2010/main" val="755547897"/>
       </p:ext>
     </p:extLst>
   </p:cSld>

</xml_diff>